<commit_message>
last fixes, I hope
</commit_message>
<xml_diff>
--- a/TFI_Jorge_Sanchez_Presentacion.pptx
+++ b/TFI_Jorge_Sanchez_Presentacion.pptx
@@ -514,7 +514,7 @@
     </p:spTree>
     <p:extLst>
       <p:ext uri="{BB962C8B-B14F-4D97-AF65-F5344CB8AC3E}">
-        <p14:creationId xmlns:p14="http://schemas.microsoft.com/office/powerpoint/2010/main" xmlns="" val="1623066837"/>
+        <p14:creationId xmlns="" xmlns:p14="http://schemas.microsoft.com/office/powerpoint/2010/main" val="1623066837"/>
       </p:ext>
     </p:extLst>
   </p:cSld>
@@ -1030,7 +1030,7 @@
     </p:spTree>
     <p:extLst>
       <p:ext uri="{BB962C8B-B14F-4D97-AF65-F5344CB8AC3E}">
-        <p14:creationId xmlns:p14="http://schemas.microsoft.com/office/powerpoint/2010/main" xmlns="" val="2468071057"/>
+        <p14:creationId xmlns="" xmlns:p14="http://schemas.microsoft.com/office/powerpoint/2010/main" val="2468071057"/>
       </p:ext>
     </p:extLst>
   </p:cSld>
@@ -1956,7 +1956,7 @@
     </p:spTree>
     <p:extLst>
       <p:ext uri="{BB962C8B-B14F-4D97-AF65-F5344CB8AC3E}">
-        <p14:creationId xmlns:p14="http://schemas.microsoft.com/office/powerpoint/2010/main" xmlns="" val="1406439935"/>
+        <p14:creationId xmlns="" xmlns:p14="http://schemas.microsoft.com/office/powerpoint/2010/main" val="1406439935"/>
       </p:ext>
     </p:extLst>
   </p:cSld>
@@ -2205,7 +2205,7 @@
     </p:spTree>
     <p:extLst>
       <p:ext uri="{BB962C8B-B14F-4D97-AF65-F5344CB8AC3E}">
-        <p14:creationId xmlns:p14="http://schemas.microsoft.com/office/powerpoint/2010/main" xmlns="" val="3357091481"/>
+        <p14:creationId xmlns="" xmlns:p14="http://schemas.microsoft.com/office/powerpoint/2010/main" val="3357091481"/>
       </p:ext>
     </p:extLst>
   </p:cSld>
@@ -3712,7 +3712,7 @@
     </p:spTree>
     <p:extLst>
       <p:ext uri="{BB962C8B-B14F-4D97-AF65-F5344CB8AC3E}">
-        <p14:creationId xmlns:p14="http://schemas.microsoft.com/office/powerpoint/2010/main" xmlns="" val="2424470151"/>
+        <p14:creationId xmlns="" xmlns:p14="http://schemas.microsoft.com/office/powerpoint/2010/main" val="2424470151"/>
       </p:ext>
     </p:extLst>
   </p:cSld>
@@ -3882,7 +3882,7 @@
     </p:spTree>
     <p:extLst>
       <p:ext uri="{BB962C8B-B14F-4D97-AF65-F5344CB8AC3E}">
-        <p14:creationId xmlns:p14="http://schemas.microsoft.com/office/powerpoint/2010/main" xmlns="" val="2475635900"/>
+        <p14:creationId xmlns="" xmlns:p14="http://schemas.microsoft.com/office/powerpoint/2010/main" val="2475635900"/>
       </p:ext>
     </p:extLst>
   </p:cSld>
@@ -4062,7 +4062,7 @@
     </p:spTree>
     <p:extLst>
       <p:ext uri="{BB962C8B-B14F-4D97-AF65-F5344CB8AC3E}">
-        <p14:creationId xmlns:p14="http://schemas.microsoft.com/office/powerpoint/2010/main" xmlns="" val="2782848553"/>
+        <p14:creationId xmlns="" xmlns:p14="http://schemas.microsoft.com/office/powerpoint/2010/main" val="2782848553"/>
       </p:ext>
     </p:extLst>
   </p:cSld>
@@ -4120,7 +4120,7 @@
           </a:xfrm>
           <a:extLst>
             <a:ext uri="{AF507438-7753-43E0-B8FC-AC1667EBCBE1}">
-              <a14:hiddenEffects xmlns:a14="http://schemas.microsoft.com/office/drawing/2010/main" xmlns="">
+              <a14:hiddenEffects xmlns="" xmlns:a14="http://schemas.microsoft.com/office/drawing/2010/main">
                 <a:effectLst>
                   <a:outerShdw dist="17961" dir="2700000" algn="ctr" rotWithShape="0">
                     <a:schemeClr val="bg1"/>
@@ -4164,7 +4164,7 @@
           </a:xfrm>
           <a:extLst>
             <a:ext uri="{AF507438-7753-43E0-B8FC-AC1667EBCBE1}">
-              <a14:hiddenEffects xmlns:a14="http://schemas.microsoft.com/office/drawing/2010/main" xmlns="">
+              <a14:hiddenEffects xmlns="" xmlns:a14="http://schemas.microsoft.com/office/drawing/2010/main">
                 <a:effectLst>
                   <a:outerShdw dist="17961" dir="2700000" algn="ctr" rotWithShape="0">
                     <a:schemeClr val="bg1"/>
@@ -4317,7 +4317,7 @@
     </p:spTree>
     <p:extLst>
       <p:ext uri="{BB962C8B-B14F-4D97-AF65-F5344CB8AC3E}">
-        <p14:creationId xmlns:p14="http://schemas.microsoft.com/office/powerpoint/2010/main" xmlns="" val="1670023177"/>
+        <p14:creationId xmlns="" xmlns:p14="http://schemas.microsoft.com/office/powerpoint/2010/main" val="1670023177"/>
       </p:ext>
     </p:extLst>
   </p:cSld>
@@ -4451,7 +4451,7 @@
     </p:spTree>
     <p:extLst>
       <p:ext uri="{BB962C8B-B14F-4D97-AF65-F5344CB8AC3E}">
-        <p14:creationId xmlns:p14="http://schemas.microsoft.com/office/powerpoint/2010/main" xmlns="" val="3460492985"/>
+        <p14:creationId xmlns="" xmlns:p14="http://schemas.microsoft.com/office/powerpoint/2010/main" val="3460492985"/>
       </p:ext>
     </p:extLst>
   </p:cSld>
@@ -4688,7 +4688,7 @@
     </p:spTree>
     <p:extLst>
       <p:ext uri="{BB962C8B-B14F-4D97-AF65-F5344CB8AC3E}">
-        <p14:creationId xmlns:p14="http://schemas.microsoft.com/office/powerpoint/2010/main" xmlns="" val="2919497269"/>
+        <p14:creationId xmlns="" xmlns:p14="http://schemas.microsoft.com/office/powerpoint/2010/main" val="2919497269"/>
       </p:ext>
     </p:extLst>
   </p:cSld>
@@ -5071,7 +5071,7 @@
     </p:spTree>
     <p:extLst>
       <p:ext uri="{BB962C8B-B14F-4D97-AF65-F5344CB8AC3E}">
-        <p14:creationId xmlns:p14="http://schemas.microsoft.com/office/powerpoint/2010/main" xmlns="" val="1339960038"/>
+        <p14:creationId xmlns="" xmlns:p14="http://schemas.microsoft.com/office/powerpoint/2010/main" val="1339960038"/>
       </p:ext>
     </p:extLst>
   </p:cSld>
@@ -5145,7 +5145,7 @@
     </p:spTree>
     <p:extLst>
       <p:ext uri="{BB962C8B-B14F-4D97-AF65-F5344CB8AC3E}">
-        <p14:creationId xmlns:p14="http://schemas.microsoft.com/office/powerpoint/2010/main" xmlns="" val="1826539202"/>
+        <p14:creationId xmlns="" xmlns:p14="http://schemas.microsoft.com/office/powerpoint/2010/main" val="1826539202"/>
       </p:ext>
     </p:extLst>
   </p:cSld>
@@ -5196,7 +5196,7 @@
     </p:spTree>
     <p:extLst>
       <p:ext uri="{BB962C8B-B14F-4D97-AF65-F5344CB8AC3E}">
-        <p14:creationId xmlns:p14="http://schemas.microsoft.com/office/powerpoint/2010/main" xmlns="" val="3636677720"/>
+        <p14:creationId xmlns="" xmlns:p14="http://schemas.microsoft.com/office/powerpoint/2010/main" val="3636677720"/>
       </p:ext>
     </p:extLst>
   </p:cSld>
@@ -5415,7 +5415,7 @@
     </p:spTree>
     <p:extLst>
       <p:ext uri="{BB962C8B-B14F-4D97-AF65-F5344CB8AC3E}">
-        <p14:creationId xmlns:p14="http://schemas.microsoft.com/office/powerpoint/2010/main" xmlns="" val="1267735990"/>
+        <p14:creationId xmlns="" xmlns:p14="http://schemas.microsoft.com/office/powerpoint/2010/main" val="1267735990"/>
       </p:ext>
     </p:extLst>
   </p:cSld>
@@ -5585,7 +5585,7 @@
     </p:spTree>
     <p:extLst>
       <p:ext uri="{BB962C8B-B14F-4D97-AF65-F5344CB8AC3E}">
-        <p14:creationId xmlns:p14="http://schemas.microsoft.com/office/powerpoint/2010/main" xmlns="" val="242073700"/>
+        <p14:creationId xmlns="" xmlns:p14="http://schemas.microsoft.com/office/powerpoint/2010/main" val="242073700"/>
       </p:ext>
     </p:extLst>
   </p:cSld>
@@ -5777,7 +5777,7 @@
     </p:spTree>
     <p:extLst>
       <p:ext uri="{BB962C8B-B14F-4D97-AF65-F5344CB8AC3E}">
-        <p14:creationId xmlns:p14="http://schemas.microsoft.com/office/powerpoint/2010/main" xmlns="" val="751660398"/>
+        <p14:creationId xmlns="" xmlns:p14="http://schemas.microsoft.com/office/powerpoint/2010/main" val="751660398"/>
       </p:ext>
     </p:extLst>
   </p:cSld>
@@ -5882,7 +5882,7 @@
     </p:spTree>
     <p:extLst>
       <p:ext uri="{BB962C8B-B14F-4D97-AF65-F5344CB8AC3E}">
-        <p14:creationId xmlns:p14="http://schemas.microsoft.com/office/powerpoint/2010/main" xmlns="" val="1450872195"/>
+        <p14:creationId xmlns="" xmlns:p14="http://schemas.microsoft.com/office/powerpoint/2010/main" val="1450872195"/>
       </p:ext>
     </p:extLst>
   </p:cSld>
@@ -5997,7 +5997,7 @@
     </p:spTree>
     <p:extLst>
       <p:ext uri="{BB962C8B-B14F-4D97-AF65-F5344CB8AC3E}">
-        <p14:creationId xmlns:p14="http://schemas.microsoft.com/office/powerpoint/2010/main" xmlns="" val="3491251382"/>
+        <p14:creationId xmlns="" xmlns:p14="http://schemas.microsoft.com/office/powerpoint/2010/main" val="3491251382"/>
       </p:ext>
     </p:extLst>
   </p:cSld>
@@ -6250,7 +6250,7 @@
     </p:spTree>
     <p:extLst>
       <p:ext uri="{BB962C8B-B14F-4D97-AF65-F5344CB8AC3E}">
-        <p14:creationId xmlns:p14="http://schemas.microsoft.com/office/powerpoint/2010/main" xmlns="" val="1966276414"/>
+        <p14:creationId xmlns="" xmlns:p14="http://schemas.microsoft.com/office/powerpoint/2010/main" val="1966276414"/>
       </p:ext>
     </p:extLst>
   </p:cSld>
@@ -6538,7 +6538,7 @@
     </p:spTree>
     <p:extLst>
       <p:ext uri="{BB962C8B-B14F-4D97-AF65-F5344CB8AC3E}">
-        <p14:creationId xmlns:p14="http://schemas.microsoft.com/office/powerpoint/2010/main" xmlns="" val="1474505716"/>
+        <p14:creationId xmlns="" xmlns:p14="http://schemas.microsoft.com/office/powerpoint/2010/main" val="1474505716"/>
       </p:ext>
     </p:extLst>
   </p:cSld>
@@ -6960,7 +6960,7 @@
     </p:spTree>
     <p:extLst>
       <p:ext uri="{BB962C8B-B14F-4D97-AF65-F5344CB8AC3E}">
-        <p14:creationId xmlns:p14="http://schemas.microsoft.com/office/powerpoint/2010/main" xmlns="" val="802033519"/>
+        <p14:creationId xmlns="" xmlns:p14="http://schemas.microsoft.com/office/powerpoint/2010/main" val="802033519"/>
       </p:ext>
     </p:extLst>
   </p:cSld>
@@ -7078,7 +7078,7 @@
     </p:spTree>
     <p:extLst>
       <p:ext uri="{BB962C8B-B14F-4D97-AF65-F5344CB8AC3E}">
-        <p14:creationId xmlns:p14="http://schemas.microsoft.com/office/powerpoint/2010/main" xmlns="" val="3121803284"/>
+        <p14:creationId xmlns="" xmlns:p14="http://schemas.microsoft.com/office/powerpoint/2010/main" val="3121803284"/>
       </p:ext>
     </p:extLst>
   </p:cSld>
@@ -7173,7 +7173,7 @@
     </p:spTree>
     <p:extLst>
       <p:ext uri="{BB962C8B-B14F-4D97-AF65-F5344CB8AC3E}">
-        <p14:creationId xmlns:p14="http://schemas.microsoft.com/office/powerpoint/2010/main" xmlns="" val="999338570"/>
+        <p14:creationId xmlns="" xmlns:p14="http://schemas.microsoft.com/office/powerpoint/2010/main" val="999338570"/>
       </p:ext>
     </p:extLst>
   </p:cSld>
@@ -7458,7 +7458,7 @@
     </p:spTree>
     <p:extLst>
       <p:ext uri="{BB962C8B-B14F-4D97-AF65-F5344CB8AC3E}">
-        <p14:creationId xmlns:p14="http://schemas.microsoft.com/office/powerpoint/2010/main" xmlns="" val="359215486"/>
+        <p14:creationId xmlns="" xmlns:p14="http://schemas.microsoft.com/office/powerpoint/2010/main" val="359215486"/>
       </p:ext>
     </p:extLst>
   </p:cSld>
@@ -7715,7 +7715,7 @@
     </p:spTree>
     <p:extLst>
       <p:ext uri="{BB962C8B-B14F-4D97-AF65-F5344CB8AC3E}">
-        <p14:creationId xmlns:p14="http://schemas.microsoft.com/office/powerpoint/2010/main" xmlns="" val="2648608259"/>
+        <p14:creationId xmlns="" xmlns:p14="http://schemas.microsoft.com/office/powerpoint/2010/main" val="2648608259"/>
       </p:ext>
     </p:extLst>
   </p:cSld>
@@ -7964,7 +7964,7 @@
     </p:spTree>
     <p:extLst>
       <p:ext uri="{BB962C8B-B14F-4D97-AF65-F5344CB8AC3E}">
-        <p14:creationId xmlns:p14="http://schemas.microsoft.com/office/powerpoint/2010/main" xmlns="" val="192572331"/>
+        <p14:creationId xmlns="" xmlns:p14="http://schemas.microsoft.com/office/powerpoint/2010/main" val="192572331"/>
       </p:ext>
     </p:extLst>
   </p:cSld>
@@ -8296,14 +8296,14 @@
           <a:effectLst/>
           <a:extLst>
             <a:ext uri="{909E8E84-426E-40DD-AFC4-6F175D3DCCD1}">
-              <a14:hiddenFill xmlns:a14="http://schemas.microsoft.com/office/drawing/2010/main" xmlns="">
+              <a14:hiddenFill xmlns="" xmlns:a14="http://schemas.microsoft.com/office/drawing/2010/main">
                 <a:solidFill>
                   <a:schemeClr val="accent1"/>
                 </a:solidFill>
               </a14:hiddenFill>
             </a:ext>
             <a:ext uri="{91240B29-F687-4F45-9708-019B960494DF}">
-              <a14:hiddenLine xmlns:a14="http://schemas.microsoft.com/office/drawing/2010/main" xmlns="" w="9525">
+              <a14:hiddenLine xmlns="" xmlns:a14="http://schemas.microsoft.com/office/drawing/2010/main" w="9525">
                 <a:solidFill>
                   <a:schemeClr val="tx1"/>
                 </a:solidFill>
@@ -8313,7 +8313,7 @@
               </a14:hiddenLine>
             </a:ext>
             <a:ext uri="{AF507438-7753-43E0-B8FC-AC1667EBCBE1}">
-              <a14:hiddenEffects xmlns:a14="http://schemas.microsoft.com/office/drawing/2010/main" xmlns="">
+              <a14:hiddenEffects xmlns="" xmlns:a14="http://schemas.microsoft.com/office/drawing/2010/main">
                 <a:effectLst>
                   <a:outerShdw dist="35921" dir="2700000" algn="ctr" rotWithShape="0">
                     <a:schemeClr val="bg2"/>
@@ -8365,14 +8365,14 @@
           <a:effectLst/>
           <a:extLst>
             <a:ext uri="{909E8E84-426E-40DD-AFC4-6F175D3DCCD1}">
-              <a14:hiddenFill xmlns:a14="http://schemas.microsoft.com/office/drawing/2010/main" xmlns="">
+              <a14:hiddenFill xmlns="" xmlns:a14="http://schemas.microsoft.com/office/drawing/2010/main">
                 <a:solidFill>
                   <a:schemeClr val="accent1"/>
                 </a:solidFill>
               </a14:hiddenFill>
             </a:ext>
             <a:ext uri="{91240B29-F687-4F45-9708-019B960494DF}">
-              <a14:hiddenLine xmlns:a14="http://schemas.microsoft.com/office/drawing/2010/main" xmlns="" w="9525">
+              <a14:hiddenLine xmlns="" xmlns:a14="http://schemas.microsoft.com/office/drawing/2010/main" w="9525">
                 <a:solidFill>
                   <a:schemeClr val="tx1"/>
                 </a:solidFill>
@@ -8382,7 +8382,7 @@
               </a14:hiddenLine>
             </a:ext>
             <a:ext uri="{AF507438-7753-43E0-B8FC-AC1667EBCBE1}">
-              <a14:hiddenEffects xmlns:a14="http://schemas.microsoft.com/office/drawing/2010/main" xmlns="">
+              <a14:hiddenEffects xmlns="" xmlns:a14="http://schemas.microsoft.com/office/drawing/2010/main">
                 <a:effectLst>
                   <a:outerShdw dist="35921" dir="2700000" algn="ctr" rotWithShape="0">
                     <a:schemeClr val="bg2"/>
@@ -9033,7 +9033,7 @@
     </p:spTree>
     <p:extLst>
       <p:ext uri="{BB962C8B-B14F-4D97-AF65-F5344CB8AC3E}">
-        <p14:creationId xmlns:p14="http://schemas.microsoft.com/office/powerpoint/2010/main" xmlns="" val="1535475297"/>
+        <p14:creationId xmlns="" xmlns:p14="http://schemas.microsoft.com/office/powerpoint/2010/main" val="1535475297"/>
       </p:ext>
     </p:extLst>
   </p:cSld>
@@ -9191,7 +9191,7 @@
     <a:masterClrMapping/>
   </p:clrMapOvr>
   <mc:AlternateContent xmlns:mc="http://schemas.openxmlformats.org/markup-compatibility/2006">
-    <mc:Choice xmlns:p14="http://schemas.microsoft.com/office/powerpoint/2010/main" xmlns="" Requires="p14">
+    <mc:Choice xmlns="" xmlns:p14="http://schemas.microsoft.com/office/powerpoint/2010/main" Requires="p14">
       <p:transition spd="slow" p14:dur="2000"/>
     </mc:Choice>
     <mc:Fallback>
@@ -9946,7 +9946,7 @@
     </p:spTree>
     <p:extLst>
       <p:ext uri="{BB962C8B-B14F-4D97-AF65-F5344CB8AC3E}">
-        <p14:creationId xmlns:p14="http://schemas.microsoft.com/office/powerpoint/2010/main" xmlns="" val="4178953442"/>
+        <p14:creationId xmlns="" xmlns:p14="http://schemas.microsoft.com/office/powerpoint/2010/main" val="4178953442"/>
       </p:ext>
     </p:extLst>
   </p:cSld>
@@ -9954,7 +9954,7 @@
     <a:masterClrMapping/>
   </p:clrMapOvr>
   <mc:AlternateContent xmlns:mc="http://schemas.openxmlformats.org/markup-compatibility/2006">
-    <mc:Choice xmlns:p14="http://schemas.microsoft.com/office/powerpoint/2010/main" xmlns="" Requires="p14">
+    <mc:Choice xmlns="" xmlns:p14="http://schemas.microsoft.com/office/powerpoint/2010/main" Requires="p14">
       <p:transition spd="slow" p14:dur="2000"/>
     </mc:Choice>
     <mc:Fallback>
@@ -10648,7 +10648,7 @@
     </p:spTree>
     <p:extLst>
       <p:ext uri="{BB962C8B-B14F-4D97-AF65-F5344CB8AC3E}">
-        <p14:creationId xmlns:p14="http://schemas.microsoft.com/office/powerpoint/2010/main" xmlns="" val="3587674449"/>
+        <p14:creationId xmlns="" xmlns:p14="http://schemas.microsoft.com/office/powerpoint/2010/main" val="3587674449"/>
       </p:ext>
     </p:extLst>
   </p:cSld>
@@ -10656,7 +10656,7 @@
     <a:masterClrMapping/>
   </p:clrMapOvr>
   <mc:AlternateContent xmlns:mc="http://schemas.openxmlformats.org/markup-compatibility/2006">
-    <mc:Choice xmlns:p14="http://schemas.microsoft.com/office/powerpoint/2010/main" xmlns="" Requires="p14">
+    <mc:Choice xmlns="" xmlns:p14="http://schemas.microsoft.com/office/powerpoint/2010/main" Requires="p14">
       <p:transition spd="slow" p14:dur="2000"/>
     </mc:Choice>
     <mc:Fallback>
@@ -10961,7 +10961,7 @@
     </p:spTree>
     <p:extLst>
       <p:ext uri="{BB962C8B-B14F-4D97-AF65-F5344CB8AC3E}">
-        <p14:creationId xmlns:p14="http://schemas.microsoft.com/office/powerpoint/2010/main" xmlns="" val="1304365668"/>
+        <p14:creationId xmlns="" xmlns:p14="http://schemas.microsoft.com/office/powerpoint/2010/main" val="1304365668"/>
       </p:ext>
     </p:extLst>
   </p:cSld>
@@ -10969,7 +10969,7 @@
     <a:masterClrMapping/>
   </p:clrMapOvr>
   <mc:AlternateContent xmlns:mc="http://schemas.openxmlformats.org/markup-compatibility/2006">
-    <mc:Choice xmlns:p14="http://schemas.microsoft.com/office/powerpoint/2010/main" xmlns="" Requires="p14">
+    <mc:Choice xmlns="" xmlns:p14="http://schemas.microsoft.com/office/powerpoint/2010/main" Requires="p14">
       <p:transition spd="slow" p14:dur="2000"/>
     </mc:Choice>
     <mc:Fallback>
@@ -12020,7 +12020,7 @@
           <a:blip r:embed="rId3">
             <a:extLst>
               <a:ext uri="{28A0092B-C50C-407E-A947-70E740481C1C}">
-                <a14:useLocalDpi xmlns:a14="http://schemas.microsoft.com/office/drawing/2010/main" xmlns="" val="0"/>
+                <a14:useLocalDpi xmlns="" xmlns:a14="http://schemas.microsoft.com/office/drawing/2010/main" val="0"/>
               </a:ext>
             </a:extLst>
           </a:blip>
@@ -12044,14 +12044,14 @@
           <a:effectLst/>
           <a:extLst>
             <a:ext uri="{909E8E84-426E-40DD-AFC4-6F175D3DCCD1}">
-              <a14:hiddenFill xmlns:a14="http://schemas.microsoft.com/office/drawing/2010/main" xmlns="">
+              <a14:hiddenFill xmlns="" xmlns:a14="http://schemas.microsoft.com/office/drawing/2010/main">
                 <a:solidFill>
                   <a:schemeClr val="accent1"/>
                 </a:solidFill>
               </a14:hiddenFill>
             </a:ext>
             <a:ext uri="{91240B29-F687-4F45-9708-019B960494DF}">
-              <a14:hiddenLine xmlns:a14="http://schemas.microsoft.com/office/drawing/2010/main" xmlns="" w="9525">
+              <a14:hiddenLine xmlns="" xmlns:a14="http://schemas.microsoft.com/office/drawing/2010/main" w="9525">
                 <a:solidFill>
                   <a:schemeClr val="tx1"/>
                 </a:solidFill>
@@ -12061,7 +12061,7 @@
               </a14:hiddenLine>
             </a:ext>
             <a:ext uri="{AF507438-7753-43E0-B8FC-AC1667EBCBE1}">
-              <a14:hiddenEffects xmlns:a14="http://schemas.microsoft.com/office/drawing/2010/main" xmlns="">
+              <a14:hiddenEffects xmlns="" xmlns:a14="http://schemas.microsoft.com/office/drawing/2010/main">
                 <a:effectLst>
                   <a:outerShdw dist="35921" dir="2700000" algn="ctr" rotWithShape="0">
                     <a:schemeClr val="bg2"/>
@@ -12075,7 +12075,7 @@
     </p:spTree>
     <p:extLst>
       <p:ext uri="{BB962C8B-B14F-4D97-AF65-F5344CB8AC3E}">
-        <p14:creationId xmlns:p14="http://schemas.microsoft.com/office/powerpoint/2010/main" xmlns="" val="1420785368"/>
+        <p14:creationId xmlns="" xmlns:p14="http://schemas.microsoft.com/office/powerpoint/2010/main" val="1420785368"/>
       </p:ext>
     </p:extLst>
   </p:cSld>
@@ -12083,7 +12083,7 @@
     <a:masterClrMapping/>
   </p:clrMapOvr>
   <mc:AlternateContent xmlns:mc="http://schemas.openxmlformats.org/markup-compatibility/2006">
-    <mc:Choice xmlns:p14="http://schemas.microsoft.com/office/powerpoint/2010/main" xmlns="" Requires="p14">
+    <mc:Choice xmlns="" xmlns:p14="http://schemas.microsoft.com/office/powerpoint/2010/main" Requires="p14">
       <p:transition spd="slow" p14:dur="2000"/>
     </mc:Choice>
     <mc:Fallback>
@@ -12334,7 +12334,7 @@
     </p:spTree>
     <p:extLst>
       <p:ext uri="{BB962C8B-B14F-4D97-AF65-F5344CB8AC3E}">
-        <p14:creationId xmlns:p14="http://schemas.microsoft.com/office/powerpoint/2010/main" xmlns="" val="2552979401"/>
+        <p14:creationId xmlns="" xmlns:p14="http://schemas.microsoft.com/office/powerpoint/2010/main" val="2552979401"/>
       </p:ext>
     </p:extLst>
   </p:cSld>
@@ -12528,7 +12528,7 @@
     </p:spTree>
     <p:extLst>
       <p:ext uri="{BB962C8B-B14F-4D97-AF65-F5344CB8AC3E}">
-        <p14:creationId xmlns:p14="http://schemas.microsoft.com/office/powerpoint/2010/main" xmlns="" val="459538120"/>
+        <p14:creationId xmlns="" xmlns:p14="http://schemas.microsoft.com/office/powerpoint/2010/main" val="459538120"/>
       </p:ext>
     </p:extLst>
   </p:cSld>
@@ -12716,7 +12716,7 @@
     </p:spTree>
     <p:extLst>
       <p:ext uri="{BB962C8B-B14F-4D97-AF65-F5344CB8AC3E}">
-        <p14:creationId xmlns:p14="http://schemas.microsoft.com/office/powerpoint/2010/main" xmlns="" val="4176380551"/>
+        <p14:creationId xmlns="" xmlns:p14="http://schemas.microsoft.com/office/powerpoint/2010/main" val="4176380551"/>
       </p:ext>
     </p:extLst>
   </p:cSld>
@@ -12952,7 +12952,7 @@
           <a:blip r:embed="rId2">
             <a:extLst>
               <a:ext uri="{28A0092B-C50C-407E-A947-70E740481C1C}">
-                <a14:useLocalDpi xmlns:a14="http://schemas.microsoft.com/office/drawing/2010/main" xmlns="" val="0"/>
+                <a14:useLocalDpi xmlns="" xmlns:a14="http://schemas.microsoft.com/office/drawing/2010/main" val="0"/>
               </a:ext>
             </a:extLst>
           </a:blip>
@@ -12976,14 +12976,14 @@
           <a:effectLst/>
           <a:extLst>
             <a:ext uri="{909E8E84-426E-40DD-AFC4-6F175D3DCCD1}">
-              <a14:hiddenFill xmlns:a14="http://schemas.microsoft.com/office/drawing/2010/main" xmlns="">
+              <a14:hiddenFill xmlns="" xmlns:a14="http://schemas.microsoft.com/office/drawing/2010/main">
                 <a:solidFill>
                   <a:schemeClr val="accent1"/>
                 </a:solidFill>
               </a14:hiddenFill>
             </a:ext>
             <a:ext uri="{91240B29-F687-4F45-9708-019B960494DF}">
-              <a14:hiddenLine xmlns:a14="http://schemas.microsoft.com/office/drawing/2010/main" xmlns="" w="9525">
+              <a14:hiddenLine xmlns="" xmlns:a14="http://schemas.microsoft.com/office/drawing/2010/main" w="9525">
                 <a:solidFill>
                   <a:schemeClr val="tx1"/>
                 </a:solidFill>
@@ -12993,7 +12993,7 @@
               </a14:hiddenLine>
             </a:ext>
             <a:ext uri="{AF507438-7753-43E0-B8FC-AC1667EBCBE1}">
-              <a14:hiddenEffects xmlns:a14="http://schemas.microsoft.com/office/drawing/2010/main" xmlns="">
+              <a14:hiddenEffects xmlns="" xmlns:a14="http://schemas.microsoft.com/office/drawing/2010/main">
                 <a:effectLst>
                   <a:outerShdw dist="35921" dir="2700000" algn="ctr" rotWithShape="0">
                     <a:schemeClr val="bg2"/>
@@ -13153,7 +13153,7 @@
             <a:effectLst/>
             <a:extLst>
               <a:ext uri="{AF507438-7753-43E0-B8FC-AC1667EBCBE1}">
-                <a14:hiddenEffects xmlns:a14="http://schemas.microsoft.com/office/drawing/2010/main" xmlns="">
+                <a14:hiddenEffects xmlns="" xmlns:a14="http://schemas.microsoft.com/office/drawing/2010/main">
                   <a:effectLst>
                     <a:outerShdw dist="35921" dir="2700000" algn="ctr" rotWithShape="0">
                       <a:schemeClr val="bg2"/>
@@ -13198,7 +13198,7 @@
     </p:spTree>
     <p:extLst>
       <p:ext uri="{BB962C8B-B14F-4D97-AF65-F5344CB8AC3E}">
-        <p14:creationId xmlns:p14="http://schemas.microsoft.com/office/powerpoint/2010/main" xmlns="" val="2655346610"/>
+        <p14:creationId xmlns="" xmlns:p14="http://schemas.microsoft.com/office/powerpoint/2010/main" val="2655346610"/>
       </p:ext>
     </p:extLst>
   </p:cSld>
@@ -13997,7 +13997,7 @@
     </p:spTree>
     <p:extLst>
       <p:ext uri="{BB962C8B-B14F-4D97-AF65-F5344CB8AC3E}">
-        <p14:creationId xmlns:p14="http://schemas.microsoft.com/office/powerpoint/2010/main" xmlns="" val="275010905"/>
+        <p14:creationId xmlns="" xmlns:p14="http://schemas.microsoft.com/office/powerpoint/2010/main" val="275010905"/>
       </p:ext>
     </p:extLst>
   </p:cSld>
@@ -14352,7 +14352,7 @@
     </p:spTree>
     <p:extLst>
       <p:ext uri="{BB962C8B-B14F-4D97-AF65-F5344CB8AC3E}">
-        <p14:creationId xmlns:p14="http://schemas.microsoft.com/office/powerpoint/2010/main" xmlns="" val="3682962311"/>
+        <p14:creationId xmlns="" xmlns:p14="http://schemas.microsoft.com/office/powerpoint/2010/main" val="3682962311"/>
       </p:ext>
     </p:extLst>
   </p:cSld>
@@ -14524,7 +14524,7 @@
     </p:spTree>
     <p:extLst>
       <p:ext uri="{BB962C8B-B14F-4D97-AF65-F5344CB8AC3E}">
-        <p14:creationId xmlns:p14="http://schemas.microsoft.com/office/powerpoint/2010/main" xmlns="" val="1871638012"/>
+        <p14:creationId xmlns="" xmlns:p14="http://schemas.microsoft.com/office/powerpoint/2010/main" val="1871638012"/>
       </p:ext>
     </p:extLst>
   </p:cSld>
@@ -14718,7 +14718,7 @@
             <a:blip r:embed="rId2">
               <a:extLst>
                 <a:ext uri="{28A0092B-C50C-407E-A947-70E740481C1C}">
-                  <a14:useLocalDpi xmlns:a14="http://schemas.microsoft.com/office/drawing/2010/main" xmlns="" val="0"/>
+                  <a14:useLocalDpi xmlns="" xmlns:a14="http://schemas.microsoft.com/office/drawing/2010/main" val="0"/>
                 </a:ext>
               </a:extLst>
             </a:blip>
@@ -14742,14 +14742,14 @@
             <a:effectLst/>
             <a:extLst>
               <a:ext uri="{909E8E84-426E-40DD-AFC4-6F175D3DCCD1}">
-                <a14:hiddenFill xmlns:a14="http://schemas.microsoft.com/office/drawing/2010/main" xmlns="">
+                <a14:hiddenFill xmlns="" xmlns:a14="http://schemas.microsoft.com/office/drawing/2010/main">
                   <a:solidFill>
                     <a:schemeClr val="accent1"/>
                   </a:solidFill>
                 </a14:hiddenFill>
               </a:ext>
               <a:ext uri="{91240B29-F687-4F45-9708-019B960494DF}">
-                <a14:hiddenLine xmlns:a14="http://schemas.microsoft.com/office/drawing/2010/main" xmlns="" w="9525">
+                <a14:hiddenLine xmlns="" xmlns:a14="http://schemas.microsoft.com/office/drawing/2010/main" w="9525">
                   <a:solidFill>
                     <a:schemeClr val="tx1"/>
                   </a:solidFill>
@@ -14759,7 +14759,7 @@
                 </a14:hiddenLine>
               </a:ext>
               <a:ext uri="{AF507438-7753-43E0-B8FC-AC1667EBCBE1}">
-                <a14:hiddenEffects xmlns:a14="http://schemas.microsoft.com/office/drawing/2010/main" xmlns="">
+                <a14:hiddenEffects xmlns="" xmlns:a14="http://schemas.microsoft.com/office/drawing/2010/main">
                   <a:effectLst>
                     <a:outerShdw dist="35921" dir="2700000" algn="ctr" rotWithShape="0">
                       <a:schemeClr val="bg2"/>
@@ -14834,7 +14834,7 @@
     </p:spTree>
     <p:extLst>
       <p:ext uri="{BB962C8B-B14F-4D97-AF65-F5344CB8AC3E}">
-        <p14:creationId xmlns:p14="http://schemas.microsoft.com/office/powerpoint/2010/main" xmlns="" val="3784859153"/>
+        <p14:creationId xmlns="" xmlns:p14="http://schemas.microsoft.com/office/powerpoint/2010/main" val="3784859153"/>
       </p:ext>
     </p:extLst>
   </p:cSld>
@@ -15296,7 +15296,7 @@
           <a:blip r:embed="rId3">
             <a:extLst>
               <a:ext uri="{28A0092B-C50C-407E-A947-70E740481C1C}">
-                <a14:useLocalDpi xmlns:a14="http://schemas.microsoft.com/office/drawing/2010/main" xmlns="" val="0"/>
+                <a14:useLocalDpi xmlns="" xmlns:a14="http://schemas.microsoft.com/office/drawing/2010/main" val="0"/>
               </a:ext>
             </a:extLst>
           </a:blip>
@@ -15320,14 +15320,14 @@
           <a:effectLst/>
           <a:extLst>
             <a:ext uri="{909E8E84-426E-40DD-AFC4-6F175D3DCCD1}">
-              <a14:hiddenFill xmlns:a14="http://schemas.microsoft.com/office/drawing/2010/main" xmlns="">
+              <a14:hiddenFill xmlns="" xmlns:a14="http://schemas.microsoft.com/office/drawing/2010/main">
                 <a:solidFill>
                   <a:schemeClr val="accent1"/>
                 </a:solidFill>
               </a14:hiddenFill>
             </a:ext>
             <a:ext uri="{91240B29-F687-4F45-9708-019B960494DF}">
-              <a14:hiddenLine xmlns:a14="http://schemas.microsoft.com/office/drawing/2010/main" xmlns="" w="9525">
+              <a14:hiddenLine xmlns="" xmlns:a14="http://schemas.microsoft.com/office/drawing/2010/main" w="9525">
                 <a:solidFill>
                   <a:schemeClr val="tx1"/>
                 </a:solidFill>
@@ -15337,7 +15337,7 @@
               </a14:hiddenLine>
             </a:ext>
             <a:ext uri="{AF507438-7753-43E0-B8FC-AC1667EBCBE1}">
-              <a14:hiddenEffects xmlns:a14="http://schemas.microsoft.com/office/drawing/2010/main" xmlns="">
+              <a14:hiddenEffects xmlns="" xmlns:a14="http://schemas.microsoft.com/office/drawing/2010/main">
                 <a:effectLst>
                   <a:outerShdw dist="35921" dir="2700000" algn="ctr" rotWithShape="0">
                     <a:schemeClr val="bg2"/>
@@ -15459,7 +15459,7 @@
           <a:effectLst/>
           <a:extLst>
             <a:ext uri="{91240B29-F687-4F45-9708-019B960494DF}">
-              <a14:hiddenLine xmlns:a14="http://schemas.microsoft.com/office/drawing/2010/main" xmlns="" w="9525" cap="flat" cmpd="sng" algn="ctr">
+              <a14:hiddenLine xmlns="" xmlns:a14="http://schemas.microsoft.com/office/drawing/2010/main" w="9525" cap="flat" cmpd="sng" algn="ctr">
                 <a:solidFill>
                   <a:schemeClr val="tx1"/>
                 </a:solidFill>
@@ -15470,7 +15470,7 @@
               </a14:hiddenLine>
             </a:ext>
             <a:ext uri="{AF507438-7753-43E0-B8FC-AC1667EBCBE1}">
-              <a14:hiddenEffects xmlns:a14="http://schemas.microsoft.com/office/drawing/2010/main" xmlns="">
+              <a14:hiddenEffects xmlns="" xmlns:a14="http://schemas.microsoft.com/office/drawing/2010/main">
                 <a:effectLst>
                   <a:outerShdw dist="35921" dir="2700000" algn="ctr" rotWithShape="0">
                     <a:schemeClr val="bg2"/>
@@ -15524,7 +15524,7 @@
           <a:effectLst/>
           <a:extLst>
             <a:ext uri="{AF507438-7753-43E0-B8FC-AC1667EBCBE1}">
-              <a14:hiddenEffects xmlns:a14="http://schemas.microsoft.com/office/drawing/2010/main" xmlns="">
+              <a14:hiddenEffects xmlns="" xmlns:a14="http://schemas.microsoft.com/office/drawing/2010/main">
                 <a:effectLst>
                   <a:outerShdw dist="35921" dir="2700000" algn="ctr" rotWithShape="0">
                     <a:schemeClr val="bg2"/>
@@ -15615,7 +15615,7 @@
           <a:blip r:embed="rId4">
             <a:extLst>
               <a:ext uri="{28A0092B-C50C-407E-A947-70E740481C1C}">
-                <a14:useLocalDpi xmlns:a14="http://schemas.microsoft.com/office/drawing/2010/main" xmlns="" val="0"/>
+                <a14:useLocalDpi xmlns="" xmlns:a14="http://schemas.microsoft.com/office/drawing/2010/main" val="0"/>
               </a:ext>
             </a:extLst>
           </a:blip>
@@ -15639,14 +15639,14 @@
           <a:effectLst/>
           <a:extLst>
             <a:ext uri="{909E8E84-426E-40DD-AFC4-6F175D3DCCD1}">
-              <a14:hiddenFill xmlns:a14="http://schemas.microsoft.com/office/drawing/2010/main" xmlns="">
+              <a14:hiddenFill xmlns="" xmlns:a14="http://schemas.microsoft.com/office/drawing/2010/main">
                 <a:solidFill>
                   <a:schemeClr val="accent1"/>
                 </a:solidFill>
               </a14:hiddenFill>
             </a:ext>
             <a:ext uri="{91240B29-F687-4F45-9708-019B960494DF}">
-              <a14:hiddenLine xmlns:a14="http://schemas.microsoft.com/office/drawing/2010/main" xmlns="" w="9525">
+              <a14:hiddenLine xmlns="" xmlns:a14="http://schemas.microsoft.com/office/drawing/2010/main" w="9525">
                 <a:solidFill>
                   <a:schemeClr val="tx1"/>
                 </a:solidFill>
@@ -15656,7 +15656,7 @@
               </a14:hiddenLine>
             </a:ext>
             <a:ext uri="{AF507438-7753-43E0-B8FC-AC1667EBCBE1}">
-              <a14:hiddenEffects xmlns:a14="http://schemas.microsoft.com/office/drawing/2010/main" xmlns="">
+              <a14:hiddenEffects xmlns="" xmlns:a14="http://schemas.microsoft.com/office/drawing/2010/main">
                 <a:effectLst>
                   <a:outerShdw dist="35921" dir="2700000" algn="ctr" rotWithShape="0">
                     <a:schemeClr val="bg2"/>
@@ -15731,7 +15731,7 @@
           <a:blip r:embed="rId5">
             <a:extLst>
               <a:ext uri="{28A0092B-C50C-407E-A947-70E740481C1C}">
-                <a14:useLocalDpi xmlns:a14="http://schemas.microsoft.com/office/drawing/2010/main" xmlns="" val="0"/>
+                <a14:useLocalDpi xmlns="" xmlns:a14="http://schemas.microsoft.com/office/drawing/2010/main" val="0"/>
               </a:ext>
             </a:extLst>
           </a:blip>
@@ -15755,14 +15755,14 @@
           <a:effectLst/>
           <a:extLst>
             <a:ext uri="{909E8E84-426E-40DD-AFC4-6F175D3DCCD1}">
-              <a14:hiddenFill xmlns:a14="http://schemas.microsoft.com/office/drawing/2010/main" xmlns="">
+              <a14:hiddenFill xmlns="" xmlns:a14="http://schemas.microsoft.com/office/drawing/2010/main">
                 <a:solidFill>
                   <a:schemeClr val="accent1"/>
                 </a:solidFill>
               </a14:hiddenFill>
             </a:ext>
             <a:ext uri="{91240B29-F687-4F45-9708-019B960494DF}">
-              <a14:hiddenLine xmlns:a14="http://schemas.microsoft.com/office/drawing/2010/main" xmlns="" w="9525">
+              <a14:hiddenLine xmlns="" xmlns:a14="http://schemas.microsoft.com/office/drawing/2010/main" w="9525">
                 <a:solidFill>
                   <a:schemeClr val="tx1"/>
                 </a:solidFill>
@@ -15772,7 +15772,7 @@
               </a14:hiddenLine>
             </a:ext>
             <a:ext uri="{AF507438-7753-43E0-B8FC-AC1667EBCBE1}">
-              <a14:hiddenEffects xmlns:a14="http://schemas.microsoft.com/office/drawing/2010/main" xmlns="">
+              <a14:hiddenEffects xmlns="" xmlns:a14="http://schemas.microsoft.com/office/drawing/2010/main">
                 <a:effectLst>
                   <a:outerShdw dist="35921" dir="2700000" algn="ctr" rotWithShape="0">
                     <a:schemeClr val="bg2"/>
@@ -15786,7 +15786,7 @@
     </p:spTree>
     <p:extLst>
       <p:ext uri="{BB962C8B-B14F-4D97-AF65-F5344CB8AC3E}">
-        <p14:creationId xmlns:p14="http://schemas.microsoft.com/office/powerpoint/2010/main" xmlns="" val="3970596008"/>
+        <p14:creationId xmlns="" xmlns:p14="http://schemas.microsoft.com/office/powerpoint/2010/main" val="3970596008"/>
       </p:ext>
     </p:extLst>
   </p:cSld>
@@ -16387,7 +16387,51 @@
                 <a:ea typeface="+mn-ea"/>
                 <a:cs typeface="+mn-cs"/>
               </a:rPr>
-              <a:t>Se analizaron y estudiaron el estado del arte de los sistemas de cómputo voluntario. </a:t>
+              <a:t>Se </a:t>
+            </a:r>
+            <a:r>
+              <a:rPr lang="es-AR" sz="3200" b="0" i="0" u="none" strike="noStrike" baseline="0" dirty="0" smtClean="0">
+                <a:solidFill>
+                  <a:srgbClr val="475197"/>
+                </a:solidFill>
+                <a:latin typeface="+mn-lt"/>
+                <a:ea typeface="+mn-ea"/>
+                <a:cs typeface="+mn-cs"/>
+              </a:rPr>
+              <a:t>analizó </a:t>
+            </a:r>
+            <a:r>
+              <a:rPr lang="es-AR" sz="3200" b="0" i="0" u="none" strike="noStrike" baseline="0" dirty="0" smtClean="0">
+                <a:solidFill>
+                  <a:srgbClr val="475197"/>
+                </a:solidFill>
+                <a:latin typeface="+mn-lt"/>
+                <a:ea typeface="+mn-ea"/>
+                <a:cs typeface="+mn-cs"/>
+              </a:rPr>
+              <a:t>y </a:t>
+            </a:r>
+            <a:r>
+              <a:rPr lang="es-AR" sz="3200" b="0" i="0" u="none" strike="noStrike" baseline="0" dirty="0" smtClean="0">
+                <a:solidFill>
+                  <a:srgbClr val="475197"/>
+                </a:solidFill>
+                <a:latin typeface="+mn-lt"/>
+                <a:ea typeface="+mn-ea"/>
+                <a:cs typeface="+mn-cs"/>
+              </a:rPr>
+              <a:t>estudió </a:t>
+            </a:r>
+            <a:r>
+              <a:rPr lang="es-AR" sz="3200" b="0" i="0" u="none" strike="noStrike" baseline="0" dirty="0" smtClean="0">
+                <a:solidFill>
+                  <a:srgbClr val="475197"/>
+                </a:solidFill>
+                <a:latin typeface="+mn-lt"/>
+                <a:ea typeface="+mn-ea"/>
+                <a:cs typeface="+mn-cs"/>
+              </a:rPr>
+              <a:t>el estado del arte de los sistemas de cómputo voluntario. </a:t>
             </a:r>
           </a:p>
           <a:p>
@@ -16403,7 +16447,7 @@
               <a:t>Se relevaron tecnologías y </a:t>
             </a:r>
             <a:r>
-              <a:rPr lang="es-AR" sz="3200" b="0" i="0" u="none" strike="noStrike" baseline="0" dirty="0" err="1" smtClean="0">
+              <a:rPr lang="es-AR" sz="3200" b="0" i="1" u="none" strike="noStrike" baseline="0" dirty="0" err="1" smtClean="0">
                 <a:solidFill>
                   <a:srgbClr val="475197"/>
                 </a:solidFill>
@@ -16435,8 +16479,27 @@
                 <a:ea typeface="+mn-ea"/>
                 <a:cs typeface="+mn-cs"/>
               </a:rPr>
-              <a:t>Se realizaron comparaciones de cada uno de ellos </a:t>
-            </a:r>
+              <a:t>Se realizaron comparaciones de cada uno de </a:t>
+            </a:r>
+            <a:r>
+              <a:rPr lang="es-AR" sz="3200" b="0" i="0" u="none" strike="noStrike" baseline="0" dirty="0" smtClean="0">
+                <a:solidFill>
+                  <a:srgbClr val="475197"/>
+                </a:solidFill>
+                <a:latin typeface="+mn-lt"/>
+                <a:ea typeface="+mn-ea"/>
+                <a:cs typeface="+mn-cs"/>
+              </a:rPr>
+              <a:t>ellos. </a:t>
+            </a:r>
+            <a:endParaRPr lang="es-AR" sz="3200" b="0" i="0" u="none" strike="noStrike" baseline="0" dirty="0" smtClean="0">
+              <a:solidFill>
+                <a:srgbClr val="475197"/>
+              </a:solidFill>
+              <a:latin typeface="+mn-lt"/>
+              <a:ea typeface="+mn-ea"/>
+              <a:cs typeface="+mn-cs"/>
+            </a:endParaRPr>
           </a:p>
         </p:txBody>
       </p:sp>
@@ -16446,7 +16509,7 @@
     <a:masterClrMapping/>
   </p:clrMapOvr>
   <mc:AlternateContent xmlns:mc="http://schemas.openxmlformats.org/markup-compatibility/2006">
-    <mc:Choice xmlns:p14="http://schemas.microsoft.com/office/powerpoint/2010/main" xmlns="" Requires="p14">
+    <mc:Choice xmlns="" xmlns:p14="http://schemas.microsoft.com/office/powerpoint/2010/main" Requires="p14">
       <p:transition spd="slow" p14:dur="2000"/>
     </mc:Choice>
     <mc:Fallback>
@@ -16782,7 +16845,7 @@
     </p:spTree>
     <p:extLst>
       <p:ext uri="{BB962C8B-B14F-4D97-AF65-F5344CB8AC3E}">
-        <p14:creationId xmlns:p14="http://schemas.microsoft.com/office/powerpoint/2010/main" xmlns="" val="170361548"/>
+        <p14:creationId xmlns="" xmlns:p14="http://schemas.microsoft.com/office/powerpoint/2010/main" val="170361548"/>
       </p:ext>
     </p:extLst>
   </p:cSld>
@@ -17095,7 +17158,18 @@
                 <a:ea typeface="+mn-ea"/>
                 <a:cs typeface="+mn-cs"/>
               </a:rPr>
-              <a:t> hacerlo rentado</a:t>
+              <a:t> hacerlo </a:t>
+            </a:r>
+            <a:r>
+              <a:rPr lang="es-AR" sz="3200" b="0" i="0" u="none" strike="noStrike" dirty="0" smtClean="0">
+                <a:solidFill>
+                  <a:srgbClr val="475197"/>
+                </a:solidFill>
+                <a:latin typeface="+mn-lt"/>
+                <a:ea typeface="+mn-ea"/>
+                <a:cs typeface="+mn-cs"/>
+              </a:rPr>
+              <a:t>rentado.</a:t>
             </a:r>
             <a:endParaRPr lang="es-AR" sz="3200" b="0" i="0" u="none" strike="noStrike" baseline="0" dirty="0" smtClean="0">
               <a:solidFill>
@@ -17116,10 +17190,8 @@
                 <a:ea typeface="+mn-ea"/>
                 <a:cs typeface="+mn-cs"/>
               </a:rPr>
-              <a:t>En general se estableció el punto de partida, tanto para voluntarios como para posibles investigadores. </a:t>
-            </a:r>
-          </a:p>
-          <a:p>
+              <a:t>En general se estableció </a:t>
+            </a:r>
             <a:r>
               <a:rPr lang="es-AR" sz="3200" b="0" i="0" u="none" strike="noStrike" baseline="0" dirty="0" smtClean="0">
                 <a:solidFill>
@@ -17129,10 +17201,8 @@
                 <a:ea typeface="+mn-ea"/>
                 <a:cs typeface="+mn-cs"/>
               </a:rPr>
-              <a:t>Recomendación del “mejor sistema“</a:t>
-            </a:r>
-          </a:p>
-          <a:p>
+              <a:t>un </a:t>
+            </a:r>
             <a:r>
               <a:rPr lang="es-AR" sz="3200" b="0" i="0" u="none" strike="noStrike" baseline="0" dirty="0" smtClean="0">
                 <a:solidFill>
@@ -17142,7 +17212,63 @@
                 <a:ea typeface="+mn-ea"/>
                 <a:cs typeface="+mn-cs"/>
               </a:rPr>
-              <a:t>Posibilidades de trabajo futuro</a:t>
+              <a:t>punto de partida, tanto para voluntarios como para posibles investigadores. </a:t>
+            </a:r>
+          </a:p>
+          <a:p>
+            <a:r>
+              <a:rPr lang="es-AR" sz="3200" b="0" i="0" u="none" strike="noStrike" baseline="0" dirty="0" smtClean="0">
+                <a:solidFill>
+                  <a:srgbClr val="475197"/>
+                </a:solidFill>
+                <a:latin typeface="+mn-lt"/>
+                <a:ea typeface="+mn-ea"/>
+                <a:cs typeface="+mn-cs"/>
+              </a:rPr>
+              <a:t>Recomendación del “mejor </a:t>
+            </a:r>
+            <a:r>
+              <a:rPr lang="es-AR" sz="3200" b="0" i="0" u="none" strike="noStrike" baseline="0" dirty="0" smtClean="0">
+                <a:solidFill>
+                  <a:srgbClr val="475197"/>
+                </a:solidFill>
+                <a:latin typeface="+mn-lt"/>
+                <a:ea typeface="+mn-ea"/>
+                <a:cs typeface="+mn-cs"/>
+              </a:rPr>
+              <a:t>sistema“.</a:t>
+            </a:r>
+            <a:endParaRPr lang="es-AR" sz="3200" b="0" i="0" u="none" strike="noStrike" baseline="0" dirty="0" smtClean="0">
+              <a:solidFill>
+                <a:srgbClr val="475197"/>
+              </a:solidFill>
+              <a:latin typeface="+mn-lt"/>
+              <a:ea typeface="+mn-ea"/>
+              <a:cs typeface="+mn-cs"/>
+            </a:endParaRPr>
+          </a:p>
+          <a:p>
+            <a:r>
+              <a:rPr lang="es-AR" sz="3200" b="0" i="0" u="none" strike="noStrike" baseline="0" dirty="0" smtClean="0">
+                <a:solidFill>
+                  <a:srgbClr val="475197"/>
+                </a:solidFill>
+                <a:latin typeface="+mn-lt"/>
+                <a:ea typeface="+mn-ea"/>
+                <a:cs typeface="+mn-cs"/>
+              </a:rPr>
+              <a:t>Posibilidades de trabajo </a:t>
+            </a:r>
+            <a:r>
+              <a:rPr lang="es-AR" sz="3200" b="0" i="0" u="none" strike="noStrike" baseline="0" dirty="0" smtClean="0">
+                <a:solidFill>
+                  <a:srgbClr val="475197"/>
+                </a:solidFill>
+                <a:latin typeface="+mn-lt"/>
+                <a:ea typeface="+mn-ea"/>
+                <a:cs typeface="+mn-cs"/>
+              </a:rPr>
+              <a:t>futuro.</a:t>
             </a:r>
             <a:endParaRPr lang="es-AR" dirty="0">
               <a:solidFill>
@@ -17155,7 +17281,7 @@
     </p:spTree>
     <p:extLst>
       <p:ext uri="{BB962C8B-B14F-4D97-AF65-F5344CB8AC3E}">
-        <p14:creationId xmlns:p14="http://schemas.microsoft.com/office/powerpoint/2010/main" xmlns="" val="2312799933"/>
+        <p14:creationId xmlns="" xmlns:p14="http://schemas.microsoft.com/office/powerpoint/2010/main" val="2312799933"/>
       </p:ext>
     </p:extLst>
   </p:cSld>
@@ -17494,7 +17620,7 @@
           <a:blip r:embed="rId3">
             <a:extLst>
               <a:ext uri="{28A0092B-C50C-407E-A947-70E740481C1C}">
-                <a14:useLocalDpi xmlns:a14="http://schemas.microsoft.com/office/drawing/2010/main" xmlns="" val="0"/>
+                <a14:useLocalDpi xmlns="" xmlns:a14="http://schemas.microsoft.com/office/drawing/2010/main" val="0"/>
               </a:ext>
             </a:extLst>
           </a:blip>
@@ -17514,7 +17640,7 @@
           <a:noFill/>
           <a:extLst>
             <a:ext uri="{909E8E84-426E-40DD-AFC4-6F175D3DCCD1}">
-              <a14:hiddenFill xmlns:a14="http://schemas.microsoft.com/office/drawing/2010/main" xmlns="">
+              <a14:hiddenFill xmlns="" xmlns:a14="http://schemas.microsoft.com/office/drawing/2010/main">
                 <a:solidFill>
                   <a:srgbClr val="FFFFFF"/>
                 </a:solidFill>
@@ -17535,7 +17661,7 @@
           <a:blip r:embed="rId4">
             <a:extLst>
               <a:ext uri="{BEBA8EAE-BF5A-486C-A8C5-ECC9F3942E4B}">
-                <a14:imgProps xmlns:a14="http://schemas.microsoft.com/office/drawing/2010/main" xmlns="">
+                <a14:imgProps xmlns="" xmlns:a14="http://schemas.microsoft.com/office/drawing/2010/main">
                   <a14:imgLayer r:embed="rId5">
                     <a14:imgEffect>
                       <a14:backgroundRemoval t="0" b="100000" l="0" r="90000">
@@ -17547,7 +17673,7 @@
                 </a14:imgProps>
               </a:ext>
               <a:ext uri="{28A0092B-C50C-407E-A947-70E740481C1C}">
-                <a14:useLocalDpi xmlns:a14="http://schemas.microsoft.com/office/drawing/2010/main" xmlns="" val="0"/>
+                <a14:useLocalDpi xmlns="" xmlns:a14="http://schemas.microsoft.com/office/drawing/2010/main" val="0"/>
               </a:ext>
             </a:extLst>
           </a:blip>
@@ -17567,7 +17693,7 @@
           <a:noFill/>
           <a:extLst>
             <a:ext uri="{909E8E84-426E-40DD-AFC4-6F175D3DCCD1}">
-              <a14:hiddenFill xmlns:a14="http://schemas.microsoft.com/office/drawing/2010/main" xmlns="">
+              <a14:hiddenFill xmlns="" xmlns:a14="http://schemas.microsoft.com/office/drawing/2010/main">
                 <a:solidFill>
                   <a:srgbClr val="FFFFFF"/>
                 </a:solidFill>
@@ -17588,7 +17714,7 @@
           <a:blip r:embed="rId6">
             <a:extLst>
               <a:ext uri="{BEBA8EAE-BF5A-486C-A8C5-ECC9F3942E4B}">
-                <a14:imgProps xmlns:a14="http://schemas.microsoft.com/office/drawing/2010/main" xmlns="">
+                <a14:imgProps xmlns="" xmlns:a14="http://schemas.microsoft.com/office/drawing/2010/main">
                   <a14:imgLayer r:embed="rId7">
                     <a14:imgEffect>
                       <a14:backgroundRemoval t="0" b="90000" l="10000" r="90000"/>
@@ -17597,7 +17723,7 @@
                 </a14:imgProps>
               </a:ext>
               <a:ext uri="{28A0092B-C50C-407E-A947-70E740481C1C}">
-                <a14:useLocalDpi xmlns:a14="http://schemas.microsoft.com/office/drawing/2010/main" xmlns="" val="0"/>
+                <a14:useLocalDpi xmlns="" xmlns:a14="http://schemas.microsoft.com/office/drawing/2010/main" val="0"/>
               </a:ext>
             </a:extLst>
           </a:blip>
@@ -17617,7 +17743,7 @@
           <a:noFill/>
           <a:extLst>
             <a:ext uri="{909E8E84-426E-40DD-AFC4-6F175D3DCCD1}">
-              <a14:hiddenFill xmlns:a14="http://schemas.microsoft.com/office/drawing/2010/main" xmlns="">
+              <a14:hiddenFill xmlns="" xmlns:a14="http://schemas.microsoft.com/office/drawing/2010/main">
                 <a:solidFill>
                   <a:srgbClr val="FFFFFF"/>
                 </a:solidFill>
@@ -17638,7 +17764,7 @@
           <a:blip r:embed="rId8" cstate="print">
             <a:extLst>
               <a:ext uri="{28A0092B-C50C-407E-A947-70E740481C1C}">
-                <a14:useLocalDpi xmlns:a14="http://schemas.microsoft.com/office/drawing/2010/main" xmlns="" val="0"/>
+                <a14:useLocalDpi xmlns="" xmlns:a14="http://schemas.microsoft.com/office/drawing/2010/main" val="0"/>
               </a:ext>
             </a:extLst>
           </a:blip>
@@ -17658,7 +17784,7 @@
           <a:noFill/>
           <a:extLst>
             <a:ext uri="{909E8E84-426E-40DD-AFC4-6F175D3DCCD1}">
-              <a14:hiddenFill xmlns:a14="http://schemas.microsoft.com/office/drawing/2010/main" xmlns="">
+              <a14:hiddenFill xmlns="" xmlns:a14="http://schemas.microsoft.com/office/drawing/2010/main">
                 <a:solidFill>
                   <a:srgbClr val="FFFFFF"/>
                 </a:solidFill>
@@ -17679,7 +17805,7 @@
           <a:blip r:embed="rId9">
             <a:extLst>
               <a:ext uri="{28A0092B-C50C-407E-A947-70E740481C1C}">
-                <a14:useLocalDpi xmlns:a14="http://schemas.microsoft.com/office/drawing/2010/main" xmlns="" val="0"/>
+                <a14:useLocalDpi xmlns="" xmlns:a14="http://schemas.microsoft.com/office/drawing/2010/main" val="0"/>
               </a:ext>
             </a:extLst>
           </a:blip>
@@ -17708,7 +17834,7 @@
           </a:effectLst>
           <a:extLst>
             <a:ext uri="{909E8E84-426E-40DD-AFC4-6F175D3DCCD1}">
-              <a14:hiddenFill xmlns:a14="http://schemas.microsoft.com/office/drawing/2010/main" xmlns="">
+              <a14:hiddenFill xmlns="" xmlns:a14="http://schemas.microsoft.com/office/drawing/2010/main">
                 <a:solidFill>
                   <a:srgbClr val="FFFFFF"/>
                 </a:solidFill>
@@ -17740,14 +17866,14 @@
           <a:effectLst/>
           <a:extLst>
             <a:ext uri="{909E8E84-426E-40DD-AFC4-6F175D3DCCD1}">
-              <a14:hiddenFill xmlns:a14="http://schemas.microsoft.com/office/drawing/2010/main" xmlns="">
+              <a14:hiddenFill xmlns="" xmlns:a14="http://schemas.microsoft.com/office/drawing/2010/main">
                 <a:solidFill>
                   <a:schemeClr val="accent1"/>
                 </a:solidFill>
               </a14:hiddenFill>
             </a:ext>
             <a:ext uri="{91240B29-F687-4F45-9708-019B960494DF}">
-              <a14:hiddenLine xmlns:a14="http://schemas.microsoft.com/office/drawing/2010/main" xmlns="" w="9525">
+              <a14:hiddenLine xmlns="" xmlns:a14="http://schemas.microsoft.com/office/drawing/2010/main" w="9525">
                 <a:solidFill>
                   <a:schemeClr val="tx1"/>
                 </a:solidFill>
@@ -17757,7 +17883,7 @@
               </a14:hiddenLine>
             </a:ext>
             <a:ext uri="{AF507438-7753-43E0-B8FC-AC1667EBCBE1}">
-              <a14:hiddenEffects xmlns:a14="http://schemas.microsoft.com/office/drawing/2010/main" xmlns="">
+              <a14:hiddenEffects xmlns="" xmlns:a14="http://schemas.microsoft.com/office/drawing/2010/main">
                 <a:effectLst>
                   <a:outerShdw dist="35921" dir="2700000" algn="ctr" rotWithShape="0">
                     <a:schemeClr val="bg2"/>
@@ -17915,7 +18041,7 @@
     </p:spTree>
     <p:extLst>
       <p:ext uri="{BB962C8B-B14F-4D97-AF65-F5344CB8AC3E}">
-        <p14:creationId xmlns:p14="http://schemas.microsoft.com/office/powerpoint/2010/main" xmlns="" val="2581223517"/>
+        <p14:creationId xmlns="" xmlns:p14="http://schemas.microsoft.com/office/powerpoint/2010/main" val="2581223517"/>
       </p:ext>
     </p:extLst>
   </p:cSld>
@@ -20123,7 +20249,7 @@
     <a:masterClrMapping/>
   </p:clrMapOvr>
   <mc:AlternateContent xmlns:mc="http://schemas.openxmlformats.org/markup-compatibility/2006">
-    <mc:Choice xmlns:p14="http://schemas.microsoft.com/office/powerpoint/2010/main" xmlns="" Requires="p14">
+    <mc:Choice xmlns="" xmlns:p14="http://schemas.microsoft.com/office/powerpoint/2010/main" Requires="p14">
       <p:transition spd="slow" p14:dur="2000"/>
     </mc:Choice>
     <mc:Fallback>
@@ -20788,7 +20914,7 @@
     <a:masterClrMapping/>
   </p:clrMapOvr>
   <mc:AlternateContent xmlns:mc="http://schemas.openxmlformats.org/markup-compatibility/2006">
-    <mc:Choice xmlns:p14="http://schemas.microsoft.com/office/powerpoint/2010/main" xmlns="" Requires="p14">
+    <mc:Choice xmlns="" xmlns:p14="http://schemas.microsoft.com/office/powerpoint/2010/main" Requires="p14">
       <p:transition spd="slow" p14:dur="2000"/>
     </mc:Choice>
     <mc:Fallback>
@@ -21755,7 +21881,7 @@
     <a:masterClrMapping/>
   </p:clrMapOvr>
   <mc:AlternateContent xmlns:mc="http://schemas.openxmlformats.org/markup-compatibility/2006">
-    <mc:Choice xmlns:p14="http://schemas.microsoft.com/office/powerpoint/2010/main" xmlns="" Requires="p14">
+    <mc:Choice xmlns="" xmlns:p14="http://schemas.microsoft.com/office/powerpoint/2010/main" Requires="p14">
       <p:transition spd="slow" p14:dur="2000"/>
     </mc:Choice>
     <mc:Fallback>
@@ -22212,7 +22338,7 @@
           <a:blip r:embed="rId3" cstate="print">
             <a:extLst>
               <a:ext uri="{28A0092B-C50C-407E-A947-70E740481C1C}">
-                <a14:useLocalDpi xmlns:a14="http://schemas.microsoft.com/office/drawing/2010/main" xmlns="" val="0"/>
+                <a14:useLocalDpi xmlns="" xmlns:a14="http://schemas.microsoft.com/office/drawing/2010/main" val="0"/>
               </a:ext>
             </a:extLst>
           </a:blip>
@@ -22354,7 +22480,7 @@
             <a:alphaModFix/>
             <a:extLst>
               <a:ext uri="{BEBA8EAE-BF5A-486C-A8C5-ECC9F3942E4B}">
-                <a14:imgProps xmlns:a14="http://schemas.microsoft.com/office/drawing/2010/main" xmlns="">
+                <a14:imgProps xmlns="" xmlns:a14="http://schemas.microsoft.com/office/drawing/2010/main">
                   <a14:imgLayer r:embed="rId6">
                     <a14:imgEffect>
                       <a14:backgroundRemoval t="0" b="100000" l="0" r="100000"/>
@@ -22484,7 +22610,7 @@
             <a:blip r:embed="rId7">
               <a:extLst>
                 <a:ext uri="{BEBA8EAE-BF5A-486C-A8C5-ECC9F3942E4B}">
-                  <a14:imgProps xmlns:a14="http://schemas.microsoft.com/office/drawing/2010/main" xmlns="">
+                  <a14:imgProps xmlns="" xmlns:a14="http://schemas.microsoft.com/office/drawing/2010/main">
                     <a14:imgLayer r:embed="rId8">
                       <a14:imgEffect>
                         <a14:backgroundRemoval t="0" b="54074" l="0" r="100000"/>
@@ -22493,7 +22619,7 @@
                   </a14:imgProps>
                 </a:ext>
                 <a:ext uri="{28A0092B-C50C-407E-A947-70E740481C1C}">
-                  <a14:useLocalDpi xmlns:a14="http://schemas.microsoft.com/office/drawing/2010/main" xmlns="" val="0"/>
+                  <a14:useLocalDpi xmlns="" xmlns:a14="http://schemas.microsoft.com/office/drawing/2010/main" val="0"/>
                 </a:ext>
               </a:extLst>
             </a:blip>
@@ -22522,14 +22648,14 @@
             </a:effectLst>
             <a:extLst>
               <a:ext uri="{909E8E84-426E-40DD-AFC4-6F175D3DCCD1}">
-                <a14:hiddenFill xmlns:a14="http://schemas.microsoft.com/office/drawing/2010/main" xmlns="">
+                <a14:hiddenFill xmlns="" xmlns:a14="http://schemas.microsoft.com/office/drawing/2010/main">
                   <a:solidFill>
                     <a:schemeClr val="accent1"/>
                   </a:solidFill>
                 </a14:hiddenFill>
               </a:ext>
               <a:ext uri="{91240B29-F687-4F45-9708-019B960494DF}">
-                <a14:hiddenLine xmlns:a14="http://schemas.microsoft.com/office/drawing/2010/main" xmlns="" w="9525">
+                <a14:hiddenLine xmlns="" xmlns:a14="http://schemas.microsoft.com/office/drawing/2010/main" w="9525">
                   <a:solidFill>
                     <a:schemeClr val="tx1"/>
                   </a:solidFill>
@@ -22762,7 +22888,7 @@
             <a:blip r:embed="rId9" cstate="print">
               <a:extLst>
                 <a:ext uri="{28A0092B-C50C-407E-A947-70E740481C1C}">
-                  <a14:useLocalDpi xmlns:a14="http://schemas.microsoft.com/office/drawing/2010/main" xmlns="" val="0"/>
+                  <a14:useLocalDpi xmlns="" xmlns:a14="http://schemas.microsoft.com/office/drawing/2010/main" val="0"/>
                 </a:ext>
               </a:extLst>
             </a:blip>
@@ -22793,7 +22919,7 @@
           <a:blip r:embed="rId10">
             <a:extLst>
               <a:ext uri="{BEBA8EAE-BF5A-486C-A8C5-ECC9F3942E4B}">
-                <a14:imgProps xmlns:a14="http://schemas.microsoft.com/office/drawing/2010/main" xmlns="">
+                <a14:imgProps xmlns="" xmlns:a14="http://schemas.microsoft.com/office/drawing/2010/main">
                   <a14:imgLayer r:embed="rId11">
                     <a14:imgEffect>
                       <a14:sharpenSoften amount="50000"/>
@@ -22802,7 +22928,7 @@
                 </a14:imgProps>
               </a:ext>
               <a:ext uri="{28A0092B-C50C-407E-A947-70E740481C1C}">
-                <a14:useLocalDpi xmlns:a14="http://schemas.microsoft.com/office/drawing/2010/main" xmlns="" val="0"/>
+                <a14:useLocalDpi xmlns="" xmlns:a14="http://schemas.microsoft.com/office/drawing/2010/main" val="0"/>
               </a:ext>
             </a:extLst>
           </a:blip>
@@ -22835,7 +22961,7 @@
     <a:masterClrMapping/>
   </p:clrMapOvr>
   <mc:AlternateContent xmlns:mc="http://schemas.openxmlformats.org/markup-compatibility/2006">
-    <mc:Choice xmlns:p14="http://schemas.microsoft.com/office/powerpoint/2010/main" xmlns="" Requires="p14">
+    <mc:Choice xmlns="" xmlns:p14="http://schemas.microsoft.com/office/powerpoint/2010/main" Requires="p14">
       <p:transition spd="slow" p14:dur="2000"/>
     </mc:Choice>
     <mc:Fallback>
@@ -23495,7 +23621,7 @@
           <a:blip r:embed="rId3" cstate="print">
             <a:extLst>
               <a:ext uri="{28A0092B-C50C-407E-A947-70E740481C1C}">
-                <a14:useLocalDpi xmlns:a14="http://schemas.microsoft.com/office/drawing/2010/main" xmlns="" val="0"/>
+                <a14:useLocalDpi xmlns="" xmlns:a14="http://schemas.microsoft.com/office/drawing/2010/main" val="0"/>
               </a:ext>
             </a:extLst>
           </a:blip>
@@ -23517,14 +23643,14 @@
           </a:ln>
           <a:extLst>
             <a:ext uri="{909E8E84-426E-40DD-AFC4-6F175D3DCCD1}">
-              <a14:hiddenFill xmlns:a14="http://schemas.microsoft.com/office/drawing/2010/main" xmlns="">
+              <a14:hiddenFill xmlns="" xmlns:a14="http://schemas.microsoft.com/office/drawing/2010/main">
                 <a:solidFill>
                   <a:schemeClr val="accent1"/>
                 </a:solidFill>
               </a14:hiddenFill>
             </a:ext>
             <a:ext uri="{91240B29-F687-4F45-9708-019B960494DF}">
-              <a14:hiddenLine xmlns:a14="http://schemas.microsoft.com/office/drawing/2010/main" xmlns="" w="9525">
+              <a14:hiddenLine xmlns="" xmlns:a14="http://schemas.microsoft.com/office/drawing/2010/main" w="9525">
                 <a:solidFill>
                   <a:schemeClr val="tx1"/>
                 </a:solidFill>
@@ -23542,7 +23668,7 @@
     <a:masterClrMapping/>
   </p:clrMapOvr>
   <mc:AlternateContent xmlns:mc="http://schemas.openxmlformats.org/markup-compatibility/2006">
-    <mc:Choice xmlns:p14="http://schemas.microsoft.com/office/powerpoint/2010/main" xmlns="" Requires="p14">
+    <mc:Choice xmlns="" xmlns:p14="http://schemas.microsoft.com/office/powerpoint/2010/main" Requires="p14">
       <p:transition spd="slow" p14:dur="2000"/>
     </mc:Choice>
     <mc:Fallback>
@@ -23998,7 +24124,7 @@
     <a:masterClrMapping/>
   </p:clrMapOvr>
   <mc:AlternateContent xmlns:mc="http://schemas.openxmlformats.org/markup-compatibility/2006">
-    <mc:Choice xmlns:p14="http://schemas.microsoft.com/office/powerpoint/2010/main" xmlns="" Requires="p14">
+    <mc:Choice xmlns="" xmlns:p14="http://schemas.microsoft.com/office/powerpoint/2010/main" Requires="p14">
       <p:transition spd="slow" p14:dur="2000"/>
     </mc:Choice>
     <mc:Fallback>
@@ -24244,7 +24370,7 @@
     <a:masterClrMapping/>
   </p:clrMapOvr>
   <mc:AlternateContent xmlns:mc="http://schemas.openxmlformats.org/markup-compatibility/2006">
-    <mc:Choice xmlns:p14="http://schemas.microsoft.com/office/powerpoint/2010/main" xmlns="" Requires="p14">
+    <mc:Choice xmlns="" xmlns:p14="http://schemas.microsoft.com/office/powerpoint/2010/main" Requires="p14">
       <p:transition spd="slow" p14:dur="2000"/>
     </mc:Choice>
     <mc:Fallback>
@@ -24804,7 +24930,7 @@
         <a:effectLst/>
         <a:extLst>
           <a:ext uri="{91240B29-F687-4F45-9708-019B960494DF}">
-            <a14:hiddenLine xmlns:a14="http://schemas.microsoft.com/office/drawing/2010/main" xmlns="" w="9525" cap="flat" cmpd="sng" algn="ctr">
+            <a14:hiddenLine xmlns="" xmlns:a14="http://schemas.microsoft.com/office/drawing/2010/main" w="9525" cap="flat" cmpd="sng" algn="ctr">
               <a:solidFill>
                 <a:schemeClr val="tx1"/>
               </a:solidFill>
@@ -24815,7 +24941,7 @@
             </a14:hiddenLine>
           </a:ext>
           <a:ext uri="{AF507438-7753-43E0-B8FC-AC1667EBCBE1}">
-            <a14:hiddenEffects xmlns:a14="http://schemas.microsoft.com/office/drawing/2010/main" xmlns="">
+            <a14:hiddenEffects xmlns="" xmlns:a14="http://schemas.microsoft.com/office/drawing/2010/main">
               <a:effectLst>
                 <a:outerShdw dist="35921" dir="2700000" algn="ctr" rotWithShape="0">
                   <a:schemeClr val="bg2"/>
@@ -24896,7 +25022,7 @@
         <a:effectLst/>
         <a:extLst>
           <a:ext uri="{91240B29-F687-4F45-9708-019B960494DF}">
-            <a14:hiddenLine xmlns:a14="http://schemas.microsoft.com/office/drawing/2010/main" xmlns="" w="9525" cap="flat" cmpd="sng" algn="ctr">
+            <a14:hiddenLine xmlns="" xmlns:a14="http://schemas.microsoft.com/office/drawing/2010/main" w="9525" cap="flat" cmpd="sng" algn="ctr">
               <a:solidFill>
                 <a:schemeClr val="tx1"/>
               </a:solidFill>
@@ -24907,7 +25033,7 @@
             </a14:hiddenLine>
           </a:ext>
           <a:ext uri="{AF507438-7753-43E0-B8FC-AC1667EBCBE1}">
-            <a14:hiddenEffects xmlns:a14="http://schemas.microsoft.com/office/drawing/2010/main" xmlns="">
+            <a14:hiddenEffects xmlns="" xmlns:a14="http://schemas.microsoft.com/office/drawing/2010/main">
               <a:effectLst>
                 <a:outerShdw dist="35921" dir="2700000" algn="ctr" rotWithShape="0">
                   <a:schemeClr val="bg2"/>

</xml_diff>